<commit_message>
changed sample1 to chapter1[inc]
chapter1[incomplete]
</commit_message>
<xml_diff>
--- a/Documentation/03. 8th March Demo.pptx
+++ b/Documentation/03. 8th March Demo.pptx
@@ -144,7 +144,7 @@
   <pc:docChgLst>
     <pc:chgData name="Vikash Panjiyar" userId="e8666ecdd6edcd42" providerId="LiveId" clId="{AB575C6B-721D-46EA-80A6-16772C7DE942}"/>
     <pc:docChg chg="undo custSel addSld delSld modSld">
-      <pc:chgData name="Vikash Panjiyar" userId="e8666ecdd6edcd42" providerId="LiveId" clId="{AB575C6B-721D-46EA-80A6-16772C7DE942}" dt="2018-03-07T02:32:43.177" v="1464" actId="113"/>
+      <pc:chgData name="Vikash Panjiyar" userId="e8666ecdd6edcd42" providerId="LiveId" clId="{AB575C6B-721D-46EA-80A6-16772C7DE942}" dt="2018-03-07T14:53:50.942" v="1633" actId="20577"/>
       <pc:docMkLst>
         <pc:docMk/>
       </pc:docMkLst>
@@ -195,7 +195,7 @@
         </pc:spChg>
       </pc:sldChg>
       <pc:sldChg chg="modSp add">
-        <pc:chgData name="Vikash Panjiyar" userId="e8666ecdd6edcd42" providerId="LiveId" clId="{AB575C6B-721D-46EA-80A6-16772C7DE942}" dt="2018-03-07T02:22:07.195" v="600" actId="14100"/>
+        <pc:chgData name="Vikash Panjiyar" userId="e8666ecdd6edcd42" providerId="LiveId" clId="{AB575C6B-721D-46EA-80A6-16772C7DE942}" dt="2018-03-07T14:49:55.011" v="1486" actId="20577"/>
         <pc:sldMkLst>
           <pc:docMk/>
           <pc:sldMk cId="1212481660" sldId="267"/>
@@ -209,7 +209,7 @@
           </ac:spMkLst>
         </pc:spChg>
         <pc:spChg chg="mod">
-          <ac:chgData name="Vikash Panjiyar" userId="e8666ecdd6edcd42" providerId="LiveId" clId="{AB575C6B-721D-46EA-80A6-16772C7DE942}" dt="2018-03-07T02:22:07.195" v="600" actId="14100"/>
+          <ac:chgData name="Vikash Panjiyar" userId="e8666ecdd6edcd42" providerId="LiveId" clId="{AB575C6B-721D-46EA-80A6-16772C7DE942}" dt="2018-03-07T14:49:55.011" v="1486" actId="20577"/>
           <ac:spMkLst>
             <pc:docMk/>
             <pc:sldMk cId="1212481660" sldId="267"/>
@@ -218,7 +218,7 @@
         </pc:spChg>
       </pc:sldChg>
       <pc:sldChg chg="addSp delSp modSp add">
-        <pc:chgData name="Vikash Panjiyar" userId="e8666ecdd6edcd42" providerId="LiveId" clId="{AB575C6B-721D-46EA-80A6-16772C7DE942}" dt="2018-03-07T02:32:12.833" v="1450" actId="12385"/>
+        <pc:chgData name="Vikash Panjiyar" userId="e8666ecdd6edcd42" providerId="LiveId" clId="{AB575C6B-721D-46EA-80A6-16772C7DE942}" dt="2018-03-07T14:53:50.942" v="1633" actId="20577"/>
         <pc:sldMkLst>
           <pc:docMk/>
           <pc:sldMk cId="4211077670" sldId="268"/>
@@ -240,7 +240,7 @@
           </ac:spMkLst>
         </pc:spChg>
         <pc:graphicFrameChg chg="add mod modGraphic">
-          <ac:chgData name="Vikash Panjiyar" userId="e8666ecdd6edcd42" providerId="LiveId" clId="{AB575C6B-721D-46EA-80A6-16772C7DE942}" dt="2018-03-07T02:32:12.833" v="1450" actId="12385"/>
+          <ac:chgData name="Vikash Panjiyar" userId="e8666ecdd6edcd42" providerId="LiveId" clId="{AB575C6B-721D-46EA-80A6-16772C7DE942}" dt="2018-03-07T14:53:50.942" v="1633" actId="20577"/>
           <ac:graphicFrameMkLst>
             <pc:docMk/>
             <pc:sldMk cId="4211077670" sldId="268"/>
@@ -249,13 +249,13 @@
         </pc:graphicFrameChg>
       </pc:sldChg>
       <pc:sldChg chg="modSp add">
-        <pc:chgData name="Vikash Panjiyar" userId="e8666ecdd6edcd42" providerId="LiveId" clId="{AB575C6B-721D-46EA-80A6-16772C7DE942}" dt="2018-03-07T02:23:38.536" v="779" actId="20577"/>
+        <pc:chgData name="Vikash Panjiyar" userId="e8666ecdd6edcd42" providerId="LiveId" clId="{AB575C6B-721D-46EA-80A6-16772C7DE942}" dt="2018-03-07T14:50:45.966" v="1488" actId="20577"/>
         <pc:sldMkLst>
           <pc:docMk/>
           <pc:sldMk cId="1833553238" sldId="269"/>
         </pc:sldMkLst>
         <pc:spChg chg="mod">
-          <ac:chgData name="Vikash Panjiyar" userId="e8666ecdd6edcd42" providerId="LiveId" clId="{AB575C6B-721D-46EA-80A6-16772C7DE942}" dt="2018-03-07T02:23:38.536" v="779" actId="20577"/>
+          <ac:chgData name="Vikash Panjiyar" userId="e8666ecdd6edcd42" providerId="LiveId" clId="{AB575C6B-721D-46EA-80A6-16772C7DE942}" dt="2018-03-07T14:50:45.966" v="1488" actId="20577"/>
           <ac:spMkLst>
             <pc:docMk/>
             <pc:sldMk cId="1833553238" sldId="269"/>
@@ -4536,7 +4536,7 @@
             </a:r>
             <a:r>
               <a:rPr lang="en-GB" dirty="0" err="1"/>
-              <a:t>Yusi</a:t>
+              <a:t>Luming</a:t>
             </a:r>
             <a:endParaRPr lang="en-GB" dirty="0"/>
           </a:p>
@@ -4580,7 +4580,7 @@
             </a:r>
             <a:r>
               <a:rPr lang="en-GB" dirty="0" err="1"/>
-              <a:t>Luming</a:t>
+              <a:t>Yusi</a:t>
             </a:r>
             <a:endParaRPr lang="en-GB" dirty="0"/>
           </a:p>
@@ -4609,7 +4609,7 @@
             </a:r>
             <a:r>
               <a:rPr lang="en-GB" dirty="0" err="1"/>
-              <a:t>Yusi</a:t>
+              <a:t>Luming</a:t>
             </a:r>
             <a:endParaRPr lang="en-GB" dirty="0"/>
           </a:p>
@@ -4644,7 +4644,7 @@
             </a:r>
             <a:r>
               <a:rPr lang="en-GB" dirty="0" err="1"/>
-              <a:t>Luming</a:t>
+              <a:t>Yusi</a:t>
             </a:r>
             <a:endParaRPr lang="en-GB" dirty="0"/>
           </a:p>
@@ -4841,7 +4841,7 @@
             </a:pPr>
             <a:r>
               <a:rPr lang="en-GB" sz="2800" b="1" dirty="0"/>
-              <a:t>Key Functionalities:		40%</a:t>
+              <a:t>Key Functionalities:		30%</a:t>
             </a:r>
             <a:br>
               <a:rPr lang="en-GB" sz="2800" b="1" dirty="0"/>
@@ -4944,14 +4944,14 @@
             <p:ph idx="1"/>
             <p:extLst>
               <p:ext uri="{D42A27DB-BD31-4B8C-83A1-F6EECF244321}">
-                <p14:modId xmlns:p14="http://schemas.microsoft.com/office/powerpoint/2010/main" val="3049176552"/>
+                <p14:modId xmlns:p14="http://schemas.microsoft.com/office/powerpoint/2010/main" val="760483229"/>
               </p:ext>
             </p:extLst>
           </p:nvPr>
         </p:nvGraphicFramePr>
         <p:xfrm>
           <a:off x="1522413" y="1905000"/>
-          <a:ext cx="9134476" cy="3510280"/>
+          <a:ext cx="9134476" cy="3977640"/>
         </p:xfrm>
         <a:graphic>
           <a:graphicData uri="http://schemas.openxmlformats.org/drawingml/2006/table">
@@ -5281,7 +5281,7 @@
                       <a:pPr algn="ctr"/>
                       <a:r>
                         <a:rPr lang="en-GB" dirty="0"/>
-                        <a:t>X</a:t>
+                        <a:t>50%</a:t>
                       </a:r>
                       <a:endParaRPr lang="en-US" dirty="0"/>
                     </a:p>
@@ -5296,7 +5296,7 @@
                       <a:pPr algn="ctr"/>
                       <a:r>
                         <a:rPr lang="en-GB" dirty="0"/>
-                        <a:t>X</a:t>
+                        <a:t>25%</a:t>
                       </a:r>
                       <a:endParaRPr lang="en-US" dirty="0"/>
                     </a:p>
@@ -5311,7 +5311,7 @@
                       <a:pPr algn="ctr"/>
                       <a:r>
                         <a:rPr lang="en-GB" dirty="0"/>
-                        <a:t>X</a:t>
+                        <a:t>25%</a:t>
                       </a:r>
                       <a:endParaRPr lang="en-US" dirty="0"/>
                     </a:p>
@@ -5348,7 +5348,7 @@
                       <a:pPr algn="ctr"/>
                       <a:r>
                         <a:rPr lang="en-GB" dirty="0"/>
-                        <a:t>X</a:t>
+                        <a:t>10%</a:t>
                       </a:r>
                       <a:endParaRPr lang="en-US" dirty="0"/>
                     </a:p>
@@ -5363,7 +5363,7 @@
                       <a:pPr algn="ctr"/>
                       <a:r>
                         <a:rPr lang="en-GB" dirty="0"/>
-                        <a:t>X</a:t>
+                        <a:t>60%</a:t>
                       </a:r>
                       <a:endParaRPr lang="en-US" dirty="0"/>
                     </a:p>
@@ -5378,7 +5378,7 @@
                       <a:pPr algn="ctr"/>
                       <a:r>
                         <a:rPr lang="en-GB" dirty="0"/>
-                        <a:t>X</a:t>
+                        <a:t>20%</a:t>
                       </a:r>
                       <a:endParaRPr lang="en-US" dirty="0"/>
                     </a:p>
@@ -5388,6 +5388,140 @@
                 <a:extLst>
                   <a:ext uri="{0D108BD9-81ED-4DB2-BD59-A6C34878D82A}">
                     <a16:rowId xmlns:a16="http://schemas.microsoft.com/office/drawing/2014/main" val="355605913"/>
+                  </a:ext>
+                </a:extLst>
+              </a:tr>
+              <a:tr h="370840">
+                <a:tc>
+                  <a:txBody>
+                    <a:bodyPr/>
+                    <a:lstStyle/>
+                    <a:p>
+                      <a:pPr algn="ctr"/>
+                      <a:r>
+                        <a:rPr lang="en-GB" dirty="0"/>
+                        <a:t>Menus</a:t>
+                      </a:r>
+                      <a:endParaRPr lang="en-US" dirty="0"/>
+                    </a:p>
+                  </a:txBody>
+                  <a:tcPr/>
+                </a:tc>
+                <a:tc>
+                  <a:txBody>
+                    <a:bodyPr/>
+                    <a:lstStyle/>
+                    <a:p>
+                      <a:pPr algn="ctr"/>
+                      <a:r>
+                        <a:rPr lang="en-GB" dirty="0"/>
+                        <a:t>5%</a:t>
+                      </a:r>
+                      <a:endParaRPr lang="en-US" dirty="0"/>
+                    </a:p>
+                  </a:txBody>
+                  <a:tcPr/>
+                </a:tc>
+                <a:tc>
+                  <a:txBody>
+                    <a:bodyPr/>
+                    <a:lstStyle/>
+                    <a:p>
+                      <a:pPr algn="ctr"/>
+                      <a:r>
+                        <a:rPr lang="en-GB" dirty="0"/>
+                        <a:t>80%</a:t>
+                      </a:r>
+                      <a:endParaRPr lang="en-US" dirty="0"/>
+                    </a:p>
+                  </a:txBody>
+                  <a:tcPr/>
+                </a:tc>
+                <a:tc>
+                  <a:txBody>
+                    <a:bodyPr/>
+                    <a:lstStyle/>
+                    <a:p>
+                      <a:pPr algn="ctr"/>
+                      <a:r>
+                        <a:rPr lang="en-GB" dirty="0"/>
+                        <a:t>15%</a:t>
+                      </a:r>
+                      <a:endParaRPr lang="en-US" dirty="0"/>
+                    </a:p>
+                  </a:txBody>
+                  <a:tcPr/>
+                </a:tc>
+                <a:extLst>
+                  <a:ext uri="{0D108BD9-81ED-4DB2-BD59-A6C34878D82A}">
+                    <a16:rowId xmlns:a16="http://schemas.microsoft.com/office/drawing/2014/main" val="1538793358"/>
+                  </a:ext>
+                </a:extLst>
+              </a:tr>
+              <a:tr h="370840">
+                <a:tc>
+                  <a:txBody>
+                    <a:bodyPr/>
+                    <a:lstStyle/>
+                    <a:p>
+                      <a:pPr algn="ctr"/>
+                      <a:r>
+                        <a:rPr lang="en-GB" dirty="0"/>
+                        <a:t>Framework</a:t>
+                      </a:r>
+                      <a:endParaRPr lang="en-US" dirty="0"/>
+                    </a:p>
+                  </a:txBody>
+                  <a:tcPr/>
+                </a:tc>
+                <a:tc>
+                  <a:txBody>
+                    <a:bodyPr/>
+                    <a:lstStyle/>
+                    <a:p>
+                      <a:pPr algn="ctr"/>
+                      <a:r>
+                        <a:rPr lang="en-GB" dirty="0"/>
+                        <a:t>10%</a:t>
+                      </a:r>
+                      <a:endParaRPr lang="en-US" dirty="0"/>
+                    </a:p>
+                  </a:txBody>
+                  <a:tcPr/>
+                </a:tc>
+                <a:tc>
+                  <a:txBody>
+                    <a:bodyPr/>
+                    <a:lstStyle/>
+                    <a:p>
+                      <a:pPr algn="ctr"/>
+                      <a:r>
+                        <a:rPr lang="en-GB" dirty="0"/>
+                        <a:t>20%</a:t>
+                      </a:r>
+                      <a:endParaRPr lang="en-US" dirty="0"/>
+                    </a:p>
+                  </a:txBody>
+                  <a:tcPr/>
+                </a:tc>
+                <a:tc>
+                  <a:txBody>
+                    <a:bodyPr/>
+                    <a:lstStyle/>
+                    <a:p>
+                      <a:pPr algn="ctr"/>
+                      <a:r>
+                        <a:rPr lang="en-GB" dirty="0"/>
+                        <a:t>70%</a:t>
+                      </a:r>
+                      <a:endParaRPr lang="en-US" dirty="0"/>
+                    </a:p>
+                  </a:txBody>
+                  <a:tcPr/>
+                </a:tc>
+                <a:extLst>
+                  <a:ext uri="{0D108BD9-81ED-4DB2-BD59-A6C34878D82A}">
+                    <a16:rowId xmlns:a16="http://schemas.microsoft.com/office/drawing/2014/main" val="3605464557"/>
                   </a:ext>
                 </a:extLst>
               </a:tr>
@@ -5489,7 +5623,7 @@
                       <a:pPr algn="ctr"/>
                       <a:r>
                         <a:rPr lang="en-GB" dirty="0"/>
-                        <a:t>Client Liaison, Report Editing, UI Design, Project Managing</a:t>
+                        <a:t>Client Liaison, UI Design</a:t>
                       </a:r>
                       <a:endParaRPr lang="en-US" dirty="0"/>
                     </a:p>
@@ -5504,7 +5638,7 @@
                       <a:pPr algn="ctr"/>
                       <a:r>
                         <a:rPr lang="en-GB" dirty="0"/>
-                        <a:t>Framework implementation, Controls</a:t>
+                        <a:t>Navigation and Menus</a:t>
                       </a:r>
                       <a:endParaRPr lang="en-US" dirty="0"/>
                     </a:p>
@@ -5518,8 +5652,12 @@
                     <a:p>
                       <a:pPr algn="ctr"/>
                       <a:r>
+                        <a:rPr lang="en-GB" dirty="0" err="1"/>
+                        <a:t>Fizzyo</a:t>
+                      </a:r>
+                      <a:r>
                         <a:rPr lang="en-GB" dirty="0"/>
-                        <a:t>Navigation and Menus, Controls</a:t>
+                        <a:t> Framework Implementation</a:t>
                       </a:r>
                       <a:endParaRPr lang="en-US" dirty="0"/>
                     </a:p>

</xml_diff>

<commit_message>
file changes, documentation updates
</commit_message>
<xml_diff>
--- a/Documentation/03. 8th March Demo.pptx
+++ b/Documentation/03. 8th March Demo.pptx
@@ -144,7 +144,7 @@
   <pc:docChgLst>
     <pc:chgData name="Vikash Panjiyar" userId="e8666ecdd6edcd42" providerId="LiveId" clId="{AB575C6B-721D-46EA-80A6-16772C7DE942}"/>
     <pc:docChg chg="undo custSel addSld delSld modSld">
-      <pc:chgData name="Vikash Panjiyar" userId="e8666ecdd6edcd42" providerId="LiveId" clId="{AB575C6B-721D-46EA-80A6-16772C7DE942}" dt="2018-03-07T14:53:50.942" v="1633" actId="20577"/>
+      <pc:chgData name="Vikash Panjiyar" userId="e8666ecdd6edcd42" providerId="LiveId" clId="{AB575C6B-721D-46EA-80A6-16772C7DE942}" dt="2018-03-08T02:07:55.433" v="1706" actId="207"/>
       <pc:docMkLst>
         <pc:docMk/>
       </pc:docMkLst>
@@ -218,7 +218,7 @@
         </pc:spChg>
       </pc:sldChg>
       <pc:sldChg chg="addSp delSp modSp add">
-        <pc:chgData name="Vikash Panjiyar" userId="e8666ecdd6edcd42" providerId="LiveId" clId="{AB575C6B-721D-46EA-80A6-16772C7DE942}" dt="2018-03-07T14:53:50.942" v="1633" actId="20577"/>
+        <pc:chgData name="Vikash Panjiyar" userId="e8666ecdd6edcd42" providerId="LiveId" clId="{AB575C6B-721D-46EA-80A6-16772C7DE942}" dt="2018-03-08T02:07:55.433" v="1706" actId="207"/>
         <pc:sldMkLst>
           <pc:docMk/>
           <pc:sldMk cId="4211077670" sldId="268"/>
@@ -240,7 +240,7 @@
           </ac:spMkLst>
         </pc:spChg>
         <pc:graphicFrameChg chg="add mod modGraphic">
-          <ac:chgData name="Vikash Panjiyar" userId="e8666ecdd6edcd42" providerId="LiveId" clId="{AB575C6B-721D-46EA-80A6-16772C7DE942}" dt="2018-03-07T14:53:50.942" v="1633" actId="20577"/>
+          <ac:chgData name="Vikash Panjiyar" userId="e8666ecdd6edcd42" providerId="LiveId" clId="{AB575C6B-721D-46EA-80A6-16772C7DE942}" dt="2018-03-08T02:07:55.433" v="1706" actId="207"/>
           <ac:graphicFrameMkLst>
             <pc:docMk/>
             <pc:sldMk cId="4211077670" sldId="268"/>
@@ -420,7 +420,7 @@
           <a:p>
             <a:fld id="{59088EAF-6ECA-4616-85EF-35AA19C641F3}" type="datetimeFigureOut">
               <a:rPr lang="en-US"/>
-              <a:t>07/03/2018</a:t>
+              <a:t>08/03/2018</a:t>
             </a:fld>
             <a:endParaRPr/>
           </a:p>
@@ -585,7 +585,7 @@
           <a:p>
             <a:fld id="{3ABD2D7A-D230-4F91-BD59-0A39C2703BA8}" type="datetimeFigureOut">
               <a:rPr lang="en-US"/>
-              <a:t>07/03/2018</a:t>
+              <a:t>08/03/2018</a:t>
             </a:fld>
             <a:endParaRPr/>
           </a:p>
@@ -1194,7 +1194,7 @@
           <a:p>
             <a:fld id="{03F41C87-7AD9-4845-A077-840E4A0F3F06}" type="datetimeFigureOut">
               <a:rPr lang="en-US"/>
-              <a:t>07/03/2018</a:t>
+              <a:t>08/03/2018</a:t>
             </a:fld>
             <a:endParaRPr/>
           </a:p>
@@ -1386,7 +1386,7 @@
           <a:p>
             <a:fld id="{03F41C87-7AD9-4845-A077-840E4A0F3F06}" type="datetimeFigureOut">
               <a:rPr lang="en-US"/>
-              <a:t>07/03/2018</a:t>
+              <a:t>08/03/2018</a:t>
             </a:fld>
             <a:endParaRPr/>
           </a:p>
@@ -1575,7 +1575,7 @@
           <a:p>
             <a:fld id="{03F41C87-7AD9-4845-A077-840E4A0F3F06}" type="datetimeFigureOut">
               <a:rPr lang="en-US"/>
-              <a:t>07/03/2018</a:t>
+              <a:t>08/03/2018</a:t>
             </a:fld>
             <a:endParaRPr/>
           </a:p>
@@ -1855,7 +1855,7 @@
           <a:p>
             <a:fld id="{03F41C87-7AD9-4845-A077-840E4A0F3F06}" type="datetimeFigureOut">
               <a:rPr lang="en-US"/>
-              <a:t>07/03/2018</a:t>
+              <a:t>08/03/2018</a:t>
             </a:fld>
             <a:endParaRPr/>
           </a:p>
@@ -2159,7 +2159,7 @@
           <a:p>
             <a:fld id="{03F41C87-7AD9-4845-A077-840E4A0F3F06}" type="datetimeFigureOut">
               <a:rPr lang="en-US"/>
-              <a:t>07/03/2018</a:t>
+              <a:t>08/03/2018</a:t>
             </a:fld>
             <a:endParaRPr/>
           </a:p>
@@ -2615,7 +2615,7 @@
           <a:p>
             <a:fld id="{03F41C87-7AD9-4845-A077-840E4A0F3F06}" type="datetimeFigureOut">
               <a:rPr lang="en-US"/>
-              <a:t>07/03/2018</a:t>
+              <a:t>08/03/2018</a:t>
             </a:fld>
             <a:endParaRPr/>
           </a:p>
@@ -2745,7 +2745,7 @@
           <a:p>
             <a:fld id="{03F41C87-7AD9-4845-A077-840E4A0F3F06}" type="datetimeFigureOut">
               <a:rPr lang="en-US"/>
-              <a:t>07/03/2018</a:t>
+              <a:t>08/03/2018</a:t>
             </a:fld>
             <a:endParaRPr/>
           </a:p>
@@ -2860,7 +2860,7 @@
           <a:p>
             <a:fld id="{03F41C87-7AD9-4845-A077-840E4A0F3F06}" type="datetimeFigureOut">
               <a:rPr lang="en-US"/>
-              <a:t>07/03/2018</a:t>
+              <a:t>08/03/2018</a:t>
             </a:fld>
             <a:endParaRPr/>
           </a:p>
@@ -3182,7 +3182,7 @@
           <a:p>
             <a:fld id="{03F41C87-7AD9-4845-A077-840E4A0F3F06}" type="datetimeFigureOut">
               <a:rPr lang="en-US"/>
-              <a:t>07/03/2018</a:t>
+              <a:t>08/03/2018</a:t>
             </a:fld>
             <a:endParaRPr/>
           </a:p>
@@ -3494,7 +3494,7 @@
             <a:fld id="{03F41C87-7AD9-4845-A077-840E4A0F3F06}" type="datetimeFigureOut">
               <a:rPr lang="en-US"/>
               <a:pPr/>
-              <a:t>07/03/2018</a:t>
+              <a:t>08/03/2018</a:t>
             </a:fld>
             <a:endParaRPr/>
           </a:p>
@@ -3748,7 +3748,7 @@
             <a:fld id="{03F41C87-7AD9-4845-A077-840E4A0F3F06}" type="datetimeFigureOut">
               <a:rPr lang="en-US" smtClean="0"/>
               <a:pPr/>
-              <a:t>07/03/2018</a:t>
+              <a:t>08/03/2018</a:t>
             </a:fld>
             <a:endParaRPr lang="en-US"/>
           </a:p>
@@ -4944,14 +4944,14 @@
             <p:ph idx="1"/>
             <p:extLst>
               <p:ext uri="{D42A27DB-BD31-4B8C-83A1-F6EECF244321}">
-                <p14:modId xmlns:p14="http://schemas.microsoft.com/office/powerpoint/2010/main" val="760483229"/>
+                <p14:modId xmlns:p14="http://schemas.microsoft.com/office/powerpoint/2010/main" val="1034553707"/>
               </p:ext>
             </p:extLst>
           </p:nvPr>
         </p:nvGraphicFramePr>
         <p:xfrm>
           <a:off x="1522413" y="1905000"/>
-          <a:ext cx="9134476" cy="3977640"/>
+          <a:ext cx="9134476" cy="4622800"/>
         </p:xfrm>
         <a:graphic>
           <a:graphicData uri="http://schemas.openxmlformats.org/drawingml/2006/table">
@@ -5187,6 +5187,73 @@
                 <a:extLst>
                   <a:ext uri="{0D108BD9-81ED-4DB2-BD59-A6C34878D82A}">
                     <a16:rowId xmlns:a16="http://schemas.microsoft.com/office/drawing/2014/main" val="2454889918"/>
+                  </a:ext>
+                </a:extLst>
+              </a:tr>
+              <a:tr h="370840">
+                <a:tc>
+                  <a:txBody>
+                    <a:bodyPr/>
+                    <a:lstStyle/>
+                    <a:p>
+                      <a:pPr algn="ctr"/>
+                      <a:r>
+                        <a:rPr lang="en-GB" dirty="0"/>
+                        <a:t>Posters, Presentation</a:t>
+                      </a:r>
+                      <a:endParaRPr lang="en-US" dirty="0"/>
+                    </a:p>
+                  </a:txBody>
+                  <a:tcPr/>
+                </a:tc>
+                <a:tc>
+                  <a:txBody>
+                    <a:bodyPr/>
+                    <a:lstStyle/>
+                    <a:p>
+                      <a:pPr algn="ctr"/>
+                      <a:r>
+                        <a:rPr lang="en-GB" dirty="0"/>
+                        <a:t>70%</a:t>
+                      </a:r>
+                      <a:endParaRPr lang="en-US" dirty="0"/>
+                    </a:p>
+                  </a:txBody>
+                  <a:tcPr/>
+                </a:tc>
+                <a:tc>
+                  <a:txBody>
+                    <a:bodyPr/>
+                    <a:lstStyle/>
+                    <a:p>
+                      <a:pPr algn="ctr"/>
+                      <a:r>
+                        <a:rPr lang="en-GB" dirty="0"/>
+                        <a:t>15%</a:t>
+                      </a:r>
+                      <a:endParaRPr lang="en-US" dirty="0"/>
+                    </a:p>
+                  </a:txBody>
+                  <a:tcPr/>
+                </a:tc>
+                <a:tc>
+                  <a:txBody>
+                    <a:bodyPr/>
+                    <a:lstStyle/>
+                    <a:p>
+                      <a:pPr algn="ctr"/>
+                      <a:r>
+                        <a:rPr lang="en-GB" dirty="0"/>
+                        <a:t>15%</a:t>
+                      </a:r>
+                      <a:endParaRPr lang="en-US" dirty="0"/>
+                    </a:p>
+                  </a:txBody>
+                  <a:tcPr/>
+                </a:tc>
+                <a:extLst>
+                  <a:ext uri="{0D108BD9-81ED-4DB2-BD59-A6C34878D82A}">
+                    <a16:rowId xmlns:a16="http://schemas.microsoft.com/office/drawing/2014/main" val="3009218259"/>
                   </a:ext>
                 </a:extLst>
               </a:tr>
@@ -5533,21 +5600,27 @@
                     <a:p>
                       <a:pPr algn="ctr"/>
                       <a:r>
-                        <a:rPr lang="en-GB" dirty="0"/>
+                        <a:rPr lang="en-GB" b="1" dirty="0"/>
                         <a:t>O</a:t>
                       </a:r>
                       <a:r>
-                        <a:rPr lang="en-US" dirty="0" err="1"/>
+                        <a:rPr lang="en-US" b="1" dirty="0" err="1"/>
                         <a:t>verall</a:t>
                       </a:r>
                       <a:r>
-                        <a:rPr lang="en-US" dirty="0"/>
+                        <a:rPr lang="en-US" b="1" dirty="0"/>
                         <a:t> Contribution</a:t>
                       </a:r>
-                      <a:endParaRPr lang="en-GB" dirty="0"/>
+                      <a:endParaRPr lang="en-GB" b="1" dirty="0"/>
                     </a:p>
                   </a:txBody>
-                  <a:tcPr/>
+                  <a:tcPr>
+                    <a:solidFill>
+                      <a:schemeClr val="tx2">
+                        <a:lumMod val="25000"/>
+                      </a:schemeClr>
+                    </a:solidFill>
+                  </a:tcPr>
                 </a:tc>
                 <a:tc>
                   <a:txBody>
@@ -5556,13 +5629,19 @@
                     <a:p>
                       <a:pPr algn="ctr"/>
                       <a:r>
-                        <a:rPr lang="en-GB" dirty="0"/>
+                        <a:rPr lang="en-GB" b="1" dirty="0"/>
                         <a:t>40%</a:t>
                       </a:r>
-                      <a:endParaRPr lang="en-US" dirty="0"/>
+                      <a:endParaRPr lang="en-US" b="1" dirty="0"/>
                     </a:p>
                   </a:txBody>
-                  <a:tcPr/>
+                  <a:tcPr>
+                    <a:solidFill>
+                      <a:schemeClr val="tx2">
+                        <a:lumMod val="25000"/>
+                      </a:schemeClr>
+                    </a:solidFill>
+                  </a:tcPr>
                 </a:tc>
                 <a:tc>
                   <a:txBody>
@@ -5571,13 +5650,19 @@
                     <a:p>
                       <a:pPr algn="ctr"/>
                       <a:r>
-                        <a:rPr lang="en-GB" dirty="0"/>
+                        <a:rPr lang="en-GB" b="1" dirty="0"/>
                         <a:t>30%</a:t>
                       </a:r>
-                      <a:endParaRPr lang="en-US" dirty="0"/>
+                      <a:endParaRPr lang="en-US" b="1" dirty="0"/>
                     </a:p>
                   </a:txBody>
-                  <a:tcPr/>
+                  <a:tcPr>
+                    <a:solidFill>
+                      <a:schemeClr val="tx2">
+                        <a:lumMod val="25000"/>
+                      </a:schemeClr>
+                    </a:solidFill>
+                  </a:tcPr>
                 </a:tc>
                 <a:tc>
                   <a:txBody>
@@ -5586,13 +5671,19 @@
                     <a:p>
                       <a:pPr algn="ctr"/>
                       <a:r>
-                        <a:rPr lang="en-GB" dirty="0"/>
+                        <a:rPr lang="en-GB" b="1" dirty="0"/>
                         <a:t>30%</a:t>
                       </a:r>
-                      <a:endParaRPr lang="en-US" dirty="0"/>
+                      <a:endParaRPr lang="en-US" b="1" dirty="0"/>
                     </a:p>
                   </a:txBody>
-                  <a:tcPr/>
+                  <a:tcPr>
+                    <a:solidFill>
+                      <a:schemeClr val="tx2">
+                        <a:lumMod val="25000"/>
+                      </a:schemeClr>
+                    </a:solidFill>
+                  </a:tcPr>
                 </a:tc>
                 <a:extLst>
                   <a:ext uri="{0D108BD9-81ED-4DB2-BD59-A6C34878D82A}">
@@ -5608,12 +5699,18 @@
                     <a:p>
                       <a:pPr algn="ctr"/>
                       <a:r>
-                        <a:rPr lang="en-GB" dirty="0"/>
+                        <a:rPr lang="en-GB" b="1" dirty="0"/>
                         <a:t>Roles</a:t>
                       </a:r>
                     </a:p>
                   </a:txBody>
-                  <a:tcPr/>
+                  <a:tcPr>
+                    <a:solidFill>
+                      <a:schemeClr val="tx2">
+                        <a:lumMod val="25000"/>
+                      </a:schemeClr>
+                    </a:solidFill>
+                  </a:tcPr>
                 </a:tc>
                 <a:tc>
                   <a:txBody>
@@ -5622,13 +5719,19 @@
                     <a:p>
                       <a:pPr algn="ctr"/>
                       <a:r>
-                        <a:rPr lang="en-GB" dirty="0"/>
-                        <a:t>Client Liaison, UI Design</a:t>
+                        <a:rPr lang="en-GB" b="1" dirty="0"/>
+                        <a:t>Client Liaison, UI Design, Posters and Presentations</a:t>
                       </a:r>
-                      <a:endParaRPr lang="en-US" dirty="0"/>
+                      <a:endParaRPr lang="en-US" b="1" dirty="0"/>
                     </a:p>
                   </a:txBody>
-                  <a:tcPr/>
+                  <a:tcPr>
+                    <a:solidFill>
+                      <a:schemeClr val="tx2">
+                        <a:lumMod val="25000"/>
+                      </a:schemeClr>
+                    </a:solidFill>
+                  </a:tcPr>
                 </a:tc>
                 <a:tc>
                   <a:txBody>
@@ -5637,13 +5740,19 @@
                     <a:p>
                       <a:pPr algn="ctr"/>
                       <a:r>
-                        <a:rPr lang="en-GB" dirty="0"/>
+                        <a:rPr lang="en-GB" b="1" dirty="0"/>
                         <a:t>Navigation and Menus</a:t>
                       </a:r>
-                      <a:endParaRPr lang="en-US" dirty="0"/>
+                      <a:endParaRPr lang="en-US" b="1" dirty="0"/>
                     </a:p>
                   </a:txBody>
-                  <a:tcPr/>
+                  <a:tcPr>
+                    <a:solidFill>
+                      <a:schemeClr val="tx2">
+                        <a:lumMod val="25000"/>
+                      </a:schemeClr>
+                    </a:solidFill>
+                  </a:tcPr>
                 </a:tc>
                 <a:tc>
                   <a:txBody>
@@ -5652,17 +5761,23 @@
                     <a:p>
                       <a:pPr algn="ctr"/>
                       <a:r>
-                        <a:rPr lang="en-GB" dirty="0" err="1"/>
+                        <a:rPr lang="en-GB" b="1" dirty="0" err="1"/>
                         <a:t>Fizzyo</a:t>
                       </a:r>
                       <a:r>
-                        <a:rPr lang="en-GB" dirty="0"/>
+                        <a:rPr lang="en-GB" b="1" dirty="0"/>
                         <a:t> Framework Implementation</a:t>
                       </a:r>
-                      <a:endParaRPr lang="en-US" dirty="0"/>
+                      <a:endParaRPr lang="en-US" b="1" dirty="0"/>
                     </a:p>
                   </a:txBody>
-                  <a:tcPr/>
+                  <a:tcPr>
+                    <a:solidFill>
+                      <a:schemeClr val="tx2">
+                        <a:lumMod val="25000"/>
+                      </a:schemeClr>
+                    </a:solidFill>
+                  </a:tcPr>
                 </a:tc>
                 <a:extLst>
                   <a:ext uri="{0D108BD9-81ED-4DB2-BD59-A6C34878D82A}">

</xml_diff>